<commit_message>
Added Processing threads to powerpoint
</commit_message>
<xml_diff>
--- a/Discrete Event CPU Scheduler Dispatch Simulation.pptx
+++ b/Discrete Event CPU Scheduler Dispatch Simulation.pptx
@@ -108,11 +108,16 @@
       </a:defRPr>
     </a:lvl9pPr>
   </p:defaultTextStyle>
+  <p:extLst>
+    <p:ext uri="{EFAFB233-063F-42B5-8137-9DF3F51BA10A}">
+      <p15:sldGuideLst xmlns:p15="http://schemas.microsoft.com/office/powerpoint/2012/main"/>
+    </p:ext>
+  </p:extLst>
 </p:presentation>
 </file>
 
 <file path=ppt/charts/chart1.xml><?xml version="1.0" encoding="utf-8"?>
-<c:chartSpace xmlns:c="http://schemas.openxmlformats.org/drawingml/2006/chart" xmlns:a="http://schemas.openxmlformats.org/drawingml/2006/main" xmlns:r="http://schemas.openxmlformats.org/officeDocument/2006/relationships" xmlns:c16r2="http://schemas.microsoft.com/office/drawing/2015/06/chart">
+<c:chartSpace xmlns:c="http://schemas.openxmlformats.org/drawingml/2006/chart" xmlns:a="http://schemas.openxmlformats.org/drawingml/2006/main" xmlns:r="http://schemas.openxmlformats.org/officeDocument/2006/relationships">
   <c:date1904 val="0"/>
   <c:lang val="en-US"/>
   <c:roundedCorners val="0"/>
@@ -439,7 +444,7 @@
             </c:numRef>
           </c:val>
           <c:smooth val="0"/>
-          <c:extLst>
+          <c:extLst xmlns:c16r2="http://schemas.microsoft.com/office/drawing/2015/06/chart">
             <c:ext xmlns:c16="http://schemas.microsoft.com/office/drawing/2014/chart" uri="{C3380CC4-5D6E-409C-BE32-E72D297353CC}">
               <c16:uniqueId val="{00000000-BE91-4847-A326-0C09AD19DB57}"/>
             </c:ext>
@@ -674,7 +679,7 @@
             </c:numRef>
           </c:val>
           <c:smooth val="0"/>
-          <c:extLst>
+          <c:extLst xmlns:c16r2="http://schemas.microsoft.com/office/drawing/2015/06/chart">
             <c:ext xmlns:c16="http://schemas.microsoft.com/office/drawing/2014/chart" uri="{C3380CC4-5D6E-409C-BE32-E72D297353CC}">
               <c16:uniqueId val="{00000001-BE91-4847-A326-0C09AD19DB57}"/>
             </c:ext>
@@ -909,7 +914,7 @@
             </c:numRef>
           </c:val>
           <c:smooth val="0"/>
-          <c:extLst>
+          <c:extLst xmlns:c16r2="http://schemas.microsoft.com/office/drawing/2015/06/chart">
             <c:ext xmlns:c16="http://schemas.microsoft.com/office/drawing/2014/chart" uri="{C3380CC4-5D6E-409C-BE32-E72D297353CC}">
               <c16:uniqueId val="{00000002-BE91-4847-A326-0C09AD19DB57}"/>
             </c:ext>
@@ -925,11 +930,11 @@
         </c:dLbls>
         <c:marker val="1"/>
         <c:smooth val="0"/>
-        <c:axId val="423429584"/>
-        <c:axId val="423422696"/>
+        <c:axId val="428536456"/>
+        <c:axId val="428532536"/>
       </c:lineChart>
       <c:catAx>
-        <c:axId val="423429584"/>
+        <c:axId val="428536456"/>
         <c:scaling>
           <c:orientation val="minMax"/>
         </c:scaling>
@@ -972,7 +977,7 @@
             <a:endParaRPr lang="en-US"/>
           </a:p>
         </c:txPr>
-        <c:crossAx val="423422696"/>
+        <c:crossAx val="428532536"/>
         <c:crosses val="autoZero"/>
         <c:auto val="1"/>
         <c:lblAlgn val="ctr"/>
@@ -980,7 +985,7 @@
         <c:noMultiLvlLbl val="0"/>
       </c:catAx>
       <c:valAx>
-        <c:axId val="423422696"/>
+        <c:axId val="428532536"/>
         <c:scaling>
           <c:orientation val="minMax"/>
         </c:scaling>
@@ -1031,7 +1036,7 @@
             <a:endParaRPr lang="en-US"/>
           </a:p>
         </c:txPr>
-        <c:crossAx val="423429584"/>
+        <c:crossAx val="428536456"/>
         <c:crosses val="autoZero"/>
         <c:crossBetween val="between"/>
       </c:valAx>
@@ -1103,7 +1108,7 @@
 </file>
 
 <file path=ppt/charts/chart2.xml><?xml version="1.0" encoding="utf-8"?>
-<c:chartSpace xmlns:c="http://schemas.openxmlformats.org/drawingml/2006/chart" xmlns:a="http://schemas.openxmlformats.org/drawingml/2006/main" xmlns:r="http://schemas.openxmlformats.org/officeDocument/2006/relationships" xmlns:c16r2="http://schemas.microsoft.com/office/drawing/2015/06/chart">
+<c:chartSpace xmlns:c="http://schemas.openxmlformats.org/drawingml/2006/chart" xmlns:a="http://schemas.openxmlformats.org/drawingml/2006/main" xmlns:r="http://schemas.openxmlformats.org/officeDocument/2006/relationships">
   <c:date1904 val="0"/>
   <c:lang val="en-US"/>
   <c:roundedCorners val="0"/>
@@ -3042,7 +3047,7 @@
             </c:numRef>
           </c:val>
           <c:smooth val="0"/>
-          <c:extLst>
+          <c:extLst xmlns:c16r2="http://schemas.microsoft.com/office/drawing/2015/06/chart">
             <c:ext xmlns:c16="http://schemas.microsoft.com/office/drawing/2014/chart" uri="{C3380CC4-5D6E-409C-BE32-E72D297353CC}">
               <c16:uniqueId val="{00000000-C825-463C-A5CC-0D0BCE6439C1}"/>
             </c:ext>
@@ -4897,7 +4902,7 @@
             </c:numRef>
           </c:val>
           <c:smooth val="0"/>
-          <c:extLst>
+          <c:extLst xmlns:c16r2="http://schemas.microsoft.com/office/drawing/2015/06/chart">
             <c:ext xmlns:c16="http://schemas.microsoft.com/office/drawing/2014/chart" uri="{C3380CC4-5D6E-409C-BE32-E72D297353CC}">
               <c16:uniqueId val="{00000001-C825-463C-A5CC-0D0BCE6439C1}"/>
             </c:ext>
@@ -6752,7 +6757,7 @@
             </c:numRef>
           </c:val>
           <c:smooth val="0"/>
-          <c:extLst>
+          <c:extLst xmlns:c16r2="http://schemas.microsoft.com/office/drawing/2015/06/chart">
             <c:ext xmlns:c16="http://schemas.microsoft.com/office/drawing/2014/chart" uri="{C3380CC4-5D6E-409C-BE32-E72D297353CC}">
               <c16:uniqueId val="{00000002-C825-463C-A5CC-0D0BCE6439C1}"/>
             </c:ext>
@@ -6768,11 +6773,11 @@
         </c:dLbls>
         <c:marker val="1"/>
         <c:smooth val="0"/>
-        <c:axId val="419525616"/>
-        <c:axId val="419529880"/>
+        <c:axId val="428534496"/>
+        <c:axId val="428531752"/>
       </c:lineChart>
       <c:catAx>
-        <c:axId val="419525616"/>
+        <c:axId val="428534496"/>
         <c:scaling>
           <c:orientation val="minMax"/>
         </c:scaling>
@@ -6815,7 +6820,7 @@
             <a:endParaRPr lang="en-US"/>
           </a:p>
         </c:txPr>
-        <c:crossAx val="419529880"/>
+        <c:crossAx val="428531752"/>
         <c:crosses val="autoZero"/>
         <c:auto val="1"/>
         <c:lblAlgn val="ctr"/>
@@ -6823,7 +6828,7 @@
         <c:noMultiLvlLbl val="0"/>
       </c:catAx>
       <c:valAx>
-        <c:axId val="419529880"/>
+        <c:axId val="428531752"/>
         <c:scaling>
           <c:orientation val="minMax"/>
         </c:scaling>
@@ -6874,7 +6879,7 @@
             <a:endParaRPr lang="en-US"/>
           </a:p>
         </c:txPr>
-        <c:crossAx val="419525616"/>
+        <c:crossAx val="428534496"/>
         <c:crosses val="autoZero"/>
         <c:crossBetween val="between"/>
       </c:valAx>
@@ -6946,7 +6951,7 @@
 </file>
 
 <file path=ppt/charts/chart3.xml><?xml version="1.0" encoding="utf-8"?>
-<c:chartSpace xmlns:c="http://schemas.openxmlformats.org/drawingml/2006/chart" xmlns:a="http://schemas.openxmlformats.org/drawingml/2006/main" xmlns:r="http://schemas.openxmlformats.org/officeDocument/2006/relationships" xmlns:c16r2="http://schemas.microsoft.com/office/drawing/2015/06/chart">
+<c:chartSpace xmlns:c="http://schemas.openxmlformats.org/drawingml/2006/chart" xmlns:a="http://schemas.openxmlformats.org/drawingml/2006/main" xmlns:r="http://schemas.openxmlformats.org/officeDocument/2006/relationships">
   <c:date1904 val="0"/>
   <c:lang val="en-US"/>
   <c:roundedCorners val="0"/>
@@ -7221,7 +7226,7 @@
             </c:numRef>
           </c:val>
           <c:smooth val="0"/>
-          <c:extLst>
+          <c:extLst xmlns:c16r2="http://schemas.microsoft.com/office/drawing/2015/06/chart">
             <c:ext xmlns:c16="http://schemas.microsoft.com/office/drawing/2014/chart" uri="{C3380CC4-5D6E-409C-BE32-E72D297353CC}">
               <c16:uniqueId val="{00000000-31C4-487A-BE34-0CD2EE5F440A}"/>
             </c:ext>
@@ -7417,7 +7422,7 @@
             </c:numRef>
           </c:val>
           <c:smooth val="0"/>
-          <c:extLst>
+          <c:extLst xmlns:c16r2="http://schemas.microsoft.com/office/drawing/2015/06/chart">
             <c:ext xmlns:c16="http://schemas.microsoft.com/office/drawing/2014/chart" uri="{C3380CC4-5D6E-409C-BE32-E72D297353CC}">
               <c16:uniqueId val="{00000001-31C4-487A-BE34-0CD2EE5F440A}"/>
             </c:ext>
@@ -7613,7 +7618,7 @@
             </c:numRef>
           </c:val>
           <c:smooth val="0"/>
-          <c:extLst>
+          <c:extLst xmlns:c16r2="http://schemas.microsoft.com/office/drawing/2015/06/chart">
             <c:ext xmlns:c16="http://schemas.microsoft.com/office/drawing/2014/chart" uri="{C3380CC4-5D6E-409C-BE32-E72D297353CC}">
               <c16:uniqueId val="{00000002-31C4-487A-BE34-0CD2EE5F440A}"/>
             </c:ext>
@@ -7629,11 +7634,11 @@
         </c:dLbls>
         <c:marker val="1"/>
         <c:smooth val="0"/>
-        <c:axId val="424412752"/>
-        <c:axId val="424414064"/>
+        <c:axId val="428535672"/>
+        <c:axId val="428530184"/>
       </c:lineChart>
       <c:catAx>
-        <c:axId val="424412752"/>
+        <c:axId val="428535672"/>
         <c:scaling>
           <c:orientation val="minMax"/>
         </c:scaling>
@@ -7675,7 +7680,7 @@
             <a:endParaRPr lang="en-US"/>
           </a:p>
         </c:txPr>
-        <c:crossAx val="424414064"/>
+        <c:crossAx val="428530184"/>
         <c:crosses val="autoZero"/>
         <c:auto val="1"/>
         <c:lblAlgn val="ctr"/>
@@ -7683,7 +7688,7 @@
         <c:noMultiLvlLbl val="0"/>
       </c:catAx>
       <c:valAx>
-        <c:axId val="424414064"/>
+        <c:axId val="428530184"/>
         <c:scaling>
           <c:orientation val="minMax"/>
         </c:scaling>
@@ -7734,7 +7739,7 @@
             <a:endParaRPr lang="en-US"/>
           </a:p>
         </c:txPr>
-        <c:crossAx val="424412752"/>
+        <c:crossAx val="428535672"/>
         <c:crosses val="autoZero"/>
         <c:crossBetween val="between"/>
       </c:valAx>
@@ -13143,6 +13148,665 @@
           </a:fontRef>
         </p:style>
       </p:cxnSp>
+      <p:sp>
+        <p:nvSpPr>
+          <p:cNvPr id="2" name="Rectangle 1"/>
+          <p:cNvSpPr/>
+          <p:nvPr/>
+        </p:nvSpPr>
+        <p:spPr>
+          <a:xfrm>
+            <a:off x="9844216" y="215602"/>
+            <a:ext cx="1491049" cy="838647"/>
+          </a:xfrm>
+          <a:prstGeom prst="rect">
+            <a:avLst/>
+          </a:prstGeom>
+          <a:solidFill>
+            <a:srgbClr val="00B0F0"/>
+          </a:solidFill>
+          <a:ln>
+            <a:solidFill>
+              <a:srgbClr val="00B0F0"/>
+            </a:solidFill>
+          </a:ln>
+        </p:spPr>
+        <p:style>
+          <a:lnRef idx="2">
+            <a:schemeClr val="accent1">
+              <a:shade val="50000"/>
+            </a:schemeClr>
+          </a:lnRef>
+          <a:fillRef idx="1">
+            <a:schemeClr val="accent1"/>
+          </a:fillRef>
+          <a:effectRef idx="0">
+            <a:schemeClr val="accent1"/>
+          </a:effectRef>
+          <a:fontRef idx="minor">
+            <a:schemeClr val="lt1"/>
+          </a:fontRef>
+        </p:style>
+        <p:txBody>
+          <a:bodyPr rtlCol="0" anchor="ctr"/>
+          <a:lstStyle/>
+          <a:p>
+            <a:pPr algn="ctr"/>
+            <a:r>
+              <a:rPr lang="en-US" dirty="0" smtClean="0"/>
+              <a:t>Thread  Row 1</a:t>
+            </a:r>
+            <a:endParaRPr lang="en-US" dirty="0"/>
+          </a:p>
+        </p:txBody>
+      </p:sp>
+      <p:sp>
+        <p:nvSpPr>
+          <p:cNvPr id="14" name="Rectangle 13"/>
+          <p:cNvSpPr/>
+          <p:nvPr/>
+        </p:nvSpPr>
+        <p:spPr>
+          <a:xfrm>
+            <a:off x="9844216" y="1282401"/>
+            <a:ext cx="1491049" cy="838647"/>
+          </a:xfrm>
+          <a:prstGeom prst="rect">
+            <a:avLst/>
+          </a:prstGeom>
+          <a:solidFill>
+            <a:srgbClr val="00B0F0"/>
+          </a:solidFill>
+          <a:ln>
+            <a:solidFill>
+              <a:srgbClr val="00B0F0"/>
+            </a:solidFill>
+          </a:ln>
+        </p:spPr>
+        <p:style>
+          <a:lnRef idx="2">
+            <a:schemeClr val="accent1">
+              <a:shade val="50000"/>
+            </a:schemeClr>
+          </a:lnRef>
+          <a:fillRef idx="1">
+            <a:schemeClr val="accent1"/>
+          </a:fillRef>
+          <a:effectRef idx="0">
+            <a:schemeClr val="accent1"/>
+          </a:effectRef>
+          <a:fontRef idx="minor">
+            <a:schemeClr val="lt1"/>
+          </a:fontRef>
+        </p:style>
+        <p:txBody>
+          <a:bodyPr rtlCol="0" anchor="ctr"/>
+          <a:lstStyle/>
+          <a:p>
+            <a:pPr algn="ctr"/>
+            <a:r>
+              <a:rPr lang="en-US" dirty="0" smtClean="0"/>
+              <a:t>Thread  Row 2</a:t>
+            </a:r>
+            <a:endParaRPr lang="en-US" dirty="0"/>
+          </a:p>
+        </p:txBody>
+      </p:sp>
+      <p:sp>
+        <p:nvSpPr>
+          <p:cNvPr id="15" name="Rectangle 14"/>
+          <p:cNvSpPr/>
+          <p:nvPr/>
+        </p:nvSpPr>
+        <p:spPr>
+          <a:xfrm>
+            <a:off x="9844215" y="2349200"/>
+            <a:ext cx="1491049" cy="838647"/>
+          </a:xfrm>
+          <a:prstGeom prst="rect">
+            <a:avLst/>
+          </a:prstGeom>
+          <a:solidFill>
+            <a:srgbClr val="00B0F0"/>
+          </a:solidFill>
+          <a:ln>
+            <a:solidFill>
+              <a:srgbClr val="00B0F0"/>
+            </a:solidFill>
+          </a:ln>
+        </p:spPr>
+        <p:style>
+          <a:lnRef idx="2">
+            <a:schemeClr val="accent1">
+              <a:shade val="50000"/>
+            </a:schemeClr>
+          </a:lnRef>
+          <a:fillRef idx="1">
+            <a:schemeClr val="accent1"/>
+          </a:fillRef>
+          <a:effectRef idx="0">
+            <a:schemeClr val="accent1"/>
+          </a:effectRef>
+          <a:fontRef idx="minor">
+            <a:schemeClr val="lt1"/>
+          </a:fontRef>
+        </p:style>
+        <p:txBody>
+          <a:bodyPr rtlCol="0" anchor="ctr"/>
+          <a:lstStyle/>
+          <a:p>
+            <a:pPr algn="ctr"/>
+            <a:r>
+              <a:rPr lang="en-US" dirty="0" smtClean="0"/>
+              <a:t>Thread  Row 3</a:t>
+            </a:r>
+            <a:endParaRPr lang="en-US" dirty="0"/>
+          </a:p>
+        </p:txBody>
+      </p:sp>
+      <p:sp>
+        <p:nvSpPr>
+          <p:cNvPr id="16" name="Rectangle 15"/>
+          <p:cNvSpPr/>
+          <p:nvPr/>
+        </p:nvSpPr>
+        <p:spPr>
+          <a:xfrm>
+            <a:off x="9844214" y="3424046"/>
+            <a:ext cx="1491049" cy="838647"/>
+          </a:xfrm>
+          <a:prstGeom prst="rect">
+            <a:avLst/>
+          </a:prstGeom>
+          <a:solidFill>
+            <a:srgbClr val="00B0F0"/>
+          </a:solidFill>
+          <a:ln>
+            <a:solidFill>
+              <a:srgbClr val="00B0F0"/>
+            </a:solidFill>
+          </a:ln>
+        </p:spPr>
+        <p:style>
+          <a:lnRef idx="2">
+            <a:schemeClr val="accent1">
+              <a:shade val="50000"/>
+            </a:schemeClr>
+          </a:lnRef>
+          <a:fillRef idx="1">
+            <a:schemeClr val="accent1"/>
+          </a:fillRef>
+          <a:effectRef idx="0">
+            <a:schemeClr val="accent1"/>
+          </a:effectRef>
+          <a:fontRef idx="minor">
+            <a:schemeClr val="lt1"/>
+          </a:fontRef>
+        </p:style>
+        <p:txBody>
+          <a:bodyPr rtlCol="0" anchor="ctr"/>
+          <a:lstStyle/>
+          <a:p>
+            <a:pPr algn="ctr"/>
+            <a:r>
+              <a:rPr lang="en-US" dirty="0" smtClean="0"/>
+              <a:t>Thread  Row 4</a:t>
+            </a:r>
+            <a:endParaRPr lang="en-US" dirty="0"/>
+          </a:p>
+        </p:txBody>
+      </p:sp>
+      <p:sp>
+        <p:nvSpPr>
+          <p:cNvPr id="17" name="Rectangle 16"/>
+          <p:cNvSpPr/>
+          <p:nvPr/>
+        </p:nvSpPr>
+        <p:spPr>
+          <a:xfrm>
+            <a:off x="9844213" y="4482795"/>
+            <a:ext cx="1491049" cy="838647"/>
+          </a:xfrm>
+          <a:prstGeom prst="rect">
+            <a:avLst/>
+          </a:prstGeom>
+          <a:solidFill>
+            <a:srgbClr val="00B0F0"/>
+          </a:solidFill>
+          <a:ln>
+            <a:solidFill>
+              <a:srgbClr val="00B0F0"/>
+            </a:solidFill>
+          </a:ln>
+        </p:spPr>
+        <p:style>
+          <a:lnRef idx="2">
+            <a:schemeClr val="accent1">
+              <a:shade val="50000"/>
+            </a:schemeClr>
+          </a:lnRef>
+          <a:fillRef idx="1">
+            <a:schemeClr val="accent1"/>
+          </a:fillRef>
+          <a:effectRef idx="0">
+            <a:schemeClr val="accent1"/>
+          </a:effectRef>
+          <a:fontRef idx="minor">
+            <a:schemeClr val="lt1"/>
+          </a:fontRef>
+        </p:style>
+        <p:txBody>
+          <a:bodyPr rtlCol="0" anchor="ctr"/>
+          <a:lstStyle/>
+          <a:p>
+            <a:pPr algn="ctr"/>
+            <a:r>
+              <a:rPr lang="en-US" dirty="0" smtClean="0"/>
+              <a:t>Thread  Row 5</a:t>
+            </a:r>
+            <a:endParaRPr lang="en-US" dirty="0"/>
+          </a:p>
+        </p:txBody>
+      </p:sp>
+      <p:sp>
+        <p:nvSpPr>
+          <p:cNvPr id="18" name="Rectangle 17"/>
+          <p:cNvSpPr/>
+          <p:nvPr/>
+        </p:nvSpPr>
+        <p:spPr>
+          <a:xfrm>
+            <a:off x="9844212" y="5557641"/>
+            <a:ext cx="1491049" cy="838647"/>
+          </a:xfrm>
+          <a:prstGeom prst="rect">
+            <a:avLst/>
+          </a:prstGeom>
+          <a:solidFill>
+            <a:srgbClr val="00B0F0"/>
+          </a:solidFill>
+          <a:ln>
+            <a:solidFill>
+              <a:srgbClr val="00B0F0"/>
+            </a:solidFill>
+          </a:ln>
+        </p:spPr>
+        <p:style>
+          <a:lnRef idx="2">
+            <a:schemeClr val="accent1">
+              <a:shade val="50000"/>
+            </a:schemeClr>
+          </a:lnRef>
+          <a:fillRef idx="1">
+            <a:schemeClr val="accent1"/>
+          </a:fillRef>
+          <a:effectRef idx="0">
+            <a:schemeClr val="accent1"/>
+          </a:effectRef>
+          <a:fontRef idx="minor">
+            <a:schemeClr val="lt1"/>
+          </a:fontRef>
+        </p:style>
+        <p:txBody>
+          <a:bodyPr rtlCol="0" anchor="ctr"/>
+          <a:lstStyle/>
+          <a:p>
+            <a:pPr algn="ctr"/>
+            <a:r>
+              <a:rPr lang="en-US" dirty="0" smtClean="0"/>
+              <a:t>Thread  Row 6</a:t>
+            </a:r>
+            <a:endParaRPr lang="en-US" dirty="0"/>
+          </a:p>
+        </p:txBody>
+      </p:sp>
+      <p:cxnSp>
+        <p:nvCxnSpPr>
+          <p:cNvPr id="5" name="Straight Arrow Connector 4"/>
+          <p:cNvCxnSpPr>
+            <a:stCxn id="4" idx="3"/>
+            <a:endCxn id="2" idx="1"/>
+          </p:cNvCxnSpPr>
+          <p:nvPr/>
+        </p:nvCxnSpPr>
+        <p:spPr>
+          <a:xfrm>
+            <a:off x="9380668" y="634926"/>
+            <a:ext cx="463548" cy="0"/>
+          </a:xfrm>
+          <a:prstGeom prst="straightConnector1">
+            <a:avLst/>
+          </a:prstGeom>
+          <a:ln>
+            <a:tailEnd type="triangle"/>
+          </a:ln>
+        </p:spPr>
+        <p:style>
+          <a:lnRef idx="1">
+            <a:schemeClr val="accent1"/>
+          </a:lnRef>
+          <a:fillRef idx="0">
+            <a:schemeClr val="accent1"/>
+          </a:fillRef>
+          <a:effectRef idx="0">
+            <a:schemeClr val="accent1"/>
+          </a:effectRef>
+          <a:fontRef idx="minor">
+            <a:schemeClr val="tx1"/>
+          </a:fontRef>
+        </p:style>
+      </p:cxnSp>
+      <p:cxnSp>
+        <p:nvCxnSpPr>
+          <p:cNvPr id="25" name="Straight Arrow Connector 24"/>
+          <p:cNvCxnSpPr/>
+          <p:nvPr/>
+        </p:nvCxnSpPr>
+        <p:spPr>
+          <a:xfrm>
+            <a:off x="9380668" y="1701724"/>
+            <a:ext cx="463548" cy="0"/>
+          </a:xfrm>
+          <a:prstGeom prst="straightConnector1">
+            <a:avLst/>
+          </a:prstGeom>
+          <a:ln>
+            <a:tailEnd type="triangle"/>
+          </a:ln>
+        </p:spPr>
+        <p:style>
+          <a:lnRef idx="1">
+            <a:schemeClr val="accent1"/>
+          </a:lnRef>
+          <a:fillRef idx="0">
+            <a:schemeClr val="accent1"/>
+          </a:fillRef>
+          <a:effectRef idx="0">
+            <a:schemeClr val="accent1"/>
+          </a:effectRef>
+          <a:fontRef idx="minor">
+            <a:schemeClr val="tx1"/>
+          </a:fontRef>
+        </p:style>
+      </p:cxnSp>
+      <p:cxnSp>
+        <p:nvCxnSpPr>
+          <p:cNvPr id="26" name="Straight Arrow Connector 25"/>
+          <p:cNvCxnSpPr/>
+          <p:nvPr/>
+        </p:nvCxnSpPr>
+        <p:spPr>
+          <a:xfrm>
+            <a:off x="9380668" y="2768523"/>
+            <a:ext cx="463548" cy="0"/>
+          </a:xfrm>
+          <a:prstGeom prst="straightConnector1">
+            <a:avLst/>
+          </a:prstGeom>
+          <a:ln>
+            <a:tailEnd type="triangle"/>
+          </a:ln>
+        </p:spPr>
+        <p:style>
+          <a:lnRef idx="1">
+            <a:schemeClr val="accent1"/>
+          </a:lnRef>
+          <a:fillRef idx="0">
+            <a:schemeClr val="accent1"/>
+          </a:fillRef>
+          <a:effectRef idx="0">
+            <a:schemeClr val="accent1"/>
+          </a:effectRef>
+          <a:fontRef idx="minor">
+            <a:schemeClr val="tx1"/>
+          </a:fontRef>
+        </p:style>
+      </p:cxnSp>
+      <p:cxnSp>
+        <p:nvCxnSpPr>
+          <p:cNvPr id="27" name="Straight Arrow Connector 26"/>
+          <p:cNvCxnSpPr/>
+          <p:nvPr/>
+        </p:nvCxnSpPr>
+        <p:spPr>
+          <a:xfrm>
+            <a:off x="9380664" y="3798867"/>
+            <a:ext cx="463548" cy="0"/>
+          </a:xfrm>
+          <a:prstGeom prst="straightConnector1">
+            <a:avLst/>
+          </a:prstGeom>
+          <a:ln>
+            <a:tailEnd type="triangle"/>
+          </a:ln>
+        </p:spPr>
+        <p:style>
+          <a:lnRef idx="1">
+            <a:schemeClr val="accent1"/>
+          </a:lnRef>
+          <a:fillRef idx="0">
+            <a:schemeClr val="accent1"/>
+          </a:fillRef>
+          <a:effectRef idx="0">
+            <a:schemeClr val="accent1"/>
+          </a:effectRef>
+          <a:fontRef idx="minor">
+            <a:schemeClr val="tx1"/>
+          </a:fontRef>
+        </p:style>
+      </p:cxnSp>
+      <p:cxnSp>
+        <p:nvCxnSpPr>
+          <p:cNvPr id="28" name="Straight Arrow Connector 27"/>
+          <p:cNvCxnSpPr/>
+          <p:nvPr/>
+        </p:nvCxnSpPr>
+        <p:spPr>
+          <a:xfrm>
+            <a:off x="9380664" y="4857422"/>
+            <a:ext cx="463548" cy="0"/>
+          </a:xfrm>
+          <a:prstGeom prst="straightConnector1">
+            <a:avLst/>
+          </a:prstGeom>
+          <a:ln>
+            <a:tailEnd type="triangle"/>
+          </a:ln>
+        </p:spPr>
+        <p:style>
+          <a:lnRef idx="1">
+            <a:schemeClr val="accent1"/>
+          </a:lnRef>
+          <a:fillRef idx="0">
+            <a:schemeClr val="accent1"/>
+          </a:fillRef>
+          <a:effectRef idx="0">
+            <a:schemeClr val="accent1"/>
+          </a:effectRef>
+          <a:fontRef idx="minor">
+            <a:schemeClr val="tx1"/>
+          </a:fontRef>
+        </p:style>
+      </p:cxnSp>
+      <p:cxnSp>
+        <p:nvCxnSpPr>
+          <p:cNvPr id="29" name="Straight Arrow Connector 28"/>
+          <p:cNvCxnSpPr/>
+          <p:nvPr/>
+        </p:nvCxnSpPr>
+        <p:spPr>
+          <a:xfrm>
+            <a:off x="9380664" y="5976964"/>
+            <a:ext cx="463548" cy="0"/>
+          </a:xfrm>
+          <a:prstGeom prst="straightConnector1">
+            <a:avLst/>
+          </a:prstGeom>
+          <a:ln>
+            <a:tailEnd type="triangle"/>
+          </a:ln>
+        </p:spPr>
+        <p:style>
+          <a:lnRef idx="1">
+            <a:schemeClr val="accent1"/>
+          </a:lnRef>
+          <a:fillRef idx="0">
+            <a:schemeClr val="accent1"/>
+          </a:fillRef>
+          <a:effectRef idx="0">
+            <a:schemeClr val="accent1"/>
+          </a:effectRef>
+          <a:fontRef idx="minor">
+            <a:schemeClr val="tx1"/>
+          </a:fontRef>
+        </p:style>
+      </p:cxnSp>
+      <p:cxnSp>
+        <p:nvCxnSpPr>
+          <p:cNvPr id="7" name="Elbow Connector 6"/>
+          <p:cNvCxnSpPr>
+            <a:stCxn id="2" idx="2"/>
+          </p:cNvCxnSpPr>
+          <p:nvPr/>
+        </p:nvCxnSpPr>
+        <p:spPr>
+          <a:xfrm rot="5400000" flipH="1">
+            <a:off x="9923516" y="388025"/>
+            <a:ext cx="123373" cy="1209077"/>
+          </a:xfrm>
+          <a:prstGeom prst="bentConnector4">
+            <a:avLst>
+              <a:gd name="adj1" fmla="val -98488"/>
+              <a:gd name="adj2" fmla="val 80830"/>
+            </a:avLst>
+          </a:prstGeom>
+          <a:ln>
+            <a:tailEnd type="triangle"/>
+          </a:ln>
+        </p:spPr>
+        <p:style>
+          <a:lnRef idx="1">
+            <a:schemeClr val="accent1"/>
+          </a:lnRef>
+          <a:fillRef idx="0">
+            <a:schemeClr val="accent1"/>
+          </a:fillRef>
+          <a:effectRef idx="0">
+            <a:schemeClr val="accent1"/>
+          </a:effectRef>
+          <a:fontRef idx="minor">
+            <a:schemeClr val="tx1"/>
+          </a:fontRef>
+        </p:style>
+      </p:cxnSp>
+      <p:cxnSp>
+        <p:nvCxnSpPr>
+          <p:cNvPr id="30" name="Elbow Connector 29"/>
+          <p:cNvCxnSpPr/>
+          <p:nvPr/>
+        </p:nvCxnSpPr>
+        <p:spPr>
+          <a:xfrm rot="5400000" flipH="1">
+            <a:off x="9923511" y="1430106"/>
+            <a:ext cx="123373" cy="1209077"/>
+          </a:xfrm>
+          <a:prstGeom prst="bentConnector4">
+            <a:avLst>
+              <a:gd name="adj1" fmla="val -98488"/>
+              <a:gd name="adj2" fmla="val 80830"/>
+            </a:avLst>
+          </a:prstGeom>
+          <a:ln>
+            <a:tailEnd type="triangle"/>
+          </a:ln>
+        </p:spPr>
+        <p:style>
+          <a:lnRef idx="1">
+            <a:schemeClr val="accent1"/>
+          </a:lnRef>
+          <a:fillRef idx="0">
+            <a:schemeClr val="accent1"/>
+          </a:fillRef>
+          <a:effectRef idx="0">
+            <a:schemeClr val="accent1"/>
+          </a:effectRef>
+          <a:fontRef idx="minor">
+            <a:schemeClr val="tx1"/>
+          </a:fontRef>
+        </p:style>
+      </p:cxnSp>
+      <p:cxnSp>
+        <p:nvCxnSpPr>
+          <p:cNvPr id="31" name="Elbow Connector 30"/>
+          <p:cNvCxnSpPr/>
+          <p:nvPr/>
+        </p:nvCxnSpPr>
+        <p:spPr>
+          <a:xfrm rot="5400000" flipH="1">
+            <a:off x="9923511" y="2528185"/>
+            <a:ext cx="123373" cy="1209077"/>
+          </a:xfrm>
+          <a:prstGeom prst="bentConnector4">
+            <a:avLst>
+              <a:gd name="adj1" fmla="val -98488"/>
+              <a:gd name="adj2" fmla="val 80830"/>
+            </a:avLst>
+          </a:prstGeom>
+          <a:ln>
+            <a:tailEnd type="triangle"/>
+          </a:ln>
+        </p:spPr>
+        <p:style>
+          <a:lnRef idx="1">
+            <a:schemeClr val="accent1"/>
+          </a:lnRef>
+          <a:fillRef idx="0">
+            <a:schemeClr val="accent1"/>
+          </a:fillRef>
+          <a:effectRef idx="0">
+            <a:schemeClr val="accent1"/>
+          </a:effectRef>
+          <a:fontRef idx="minor">
+            <a:schemeClr val="tx1"/>
+          </a:fontRef>
+        </p:style>
+      </p:cxnSp>
+      <p:cxnSp>
+        <p:nvCxnSpPr>
+          <p:cNvPr id="33" name="Elbow Connector 32"/>
+          <p:cNvCxnSpPr/>
+          <p:nvPr/>
+        </p:nvCxnSpPr>
+        <p:spPr>
+          <a:xfrm rot="5400000" flipH="1">
+            <a:off x="9939982" y="4655022"/>
+            <a:ext cx="123373" cy="1209077"/>
+          </a:xfrm>
+          <a:prstGeom prst="bentConnector4">
+            <a:avLst>
+              <a:gd name="adj1" fmla="val -98488"/>
+              <a:gd name="adj2" fmla="val 80830"/>
+            </a:avLst>
+          </a:prstGeom>
+          <a:ln>
+            <a:tailEnd type="triangle"/>
+          </a:ln>
+        </p:spPr>
+        <p:style>
+          <a:lnRef idx="1">
+            <a:schemeClr val="accent1"/>
+          </a:lnRef>
+          <a:fillRef idx="0">
+            <a:schemeClr val="accent1"/>
+          </a:fillRef>
+          <a:effectRef idx="0">
+            <a:schemeClr val="accent1"/>
+          </a:effectRef>
+          <a:fontRef idx="minor">
+            <a:schemeClr val="tx1"/>
+          </a:fontRef>
+        </p:style>
+      </p:cxnSp>
     </p:spTree>
     <p:extLst>
       <p:ext uri="{BB962C8B-B14F-4D97-AF65-F5344CB8AC3E}">

</xml_diff>